<commit_message>
Cập nhật file word và file PP
</commit_message>
<xml_diff>
--- a/Slide Báo cáo.pptx
+++ b/Slide Báo cáo.pptx
@@ -647,7 +647,7 @@
           <a:p>
             <a:fld id="{EEC77E80-8391-4F66-A492-FC642785E5E6}" type="datetimeFigureOut">
               <a:rPr lang="en-US" smtClean="0"/>
-              <a:t>9/30/2025</a:t>
+              <a:t>10/4/2025</a:t>
             </a:fld>
             <a:endParaRPr lang="en-US"/>
           </a:p>
@@ -1647,7 +1647,7 @@
           <a:p>
             <a:fld id="{A3340687-F0A6-4844-9D0E-4A71047B582E}" type="datetime1">
               <a:rPr lang="en-GB" smtClean="0"/>
-              <a:t>30/09/2025</a:t>
+              <a:t>04/10/2025</a:t>
             </a:fld>
             <a:endParaRPr lang="en-GB"/>
           </a:p>
@@ -1820,7 +1820,7 @@
           <a:p>
             <a:fld id="{485F13F3-5CA4-464A-A58E-B619976AB19A}" type="datetime1">
               <a:rPr lang="en-GB" smtClean="0"/>
-              <a:t>30/09/2025</a:t>
+              <a:t>04/10/2025</a:t>
             </a:fld>
             <a:endParaRPr lang="en-GB"/>
           </a:p>
@@ -2003,7 +2003,7 @@
           <a:p>
             <a:fld id="{4580203B-5407-419A-8A7D-10870893C35F}" type="datetime1">
               <a:rPr lang="en-GB" smtClean="0"/>
-              <a:t>30/09/2025</a:t>
+              <a:t>04/10/2025</a:t>
             </a:fld>
             <a:endParaRPr lang="en-GB"/>
           </a:p>
@@ -2219,7 +2219,7 @@
             <a:fld id="{19E0BBC2-331D-455A-8F34-6CACAAA7B272}" type="datetime1">
               <a:rPr lang="en-GB" smtClean="0"/>
               <a:pPr/>
-              <a:t>30/09/2025</a:t>
+              <a:t>04/10/2025</a:t>
             </a:fld>
             <a:endParaRPr lang="en-GB"/>
           </a:p>
@@ -2477,7 +2477,7 @@
           <a:p>
             <a:fld id="{52796F3C-EA11-4B8E-A5D6-898715DAA61A}" type="datetime1">
               <a:rPr lang="en-GB" smtClean="0"/>
-              <a:t>30/09/2025</a:t>
+              <a:t>04/10/2025</a:t>
             </a:fld>
             <a:endParaRPr lang="en-GB"/>
           </a:p>
@@ -2720,7 +2720,7 @@
           <a:p>
             <a:fld id="{9DE42CF6-A011-4145-8138-B18222BE784F}" type="datetime1">
               <a:rPr lang="en-GB" smtClean="0"/>
-              <a:t>30/09/2025</a:t>
+              <a:t>04/10/2025</a:t>
             </a:fld>
             <a:endParaRPr lang="en-GB"/>
           </a:p>
@@ -3090,7 +3090,7 @@
           <a:p>
             <a:fld id="{16776141-2144-4216-A5D8-625EEC9D46A7}" type="datetime1">
               <a:rPr lang="en-GB" smtClean="0"/>
-              <a:t>30/09/2025</a:t>
+              <a:t>04/10/2025</a:t>
             </a:fld>
             <a:endParaRPr lang="en-GB"/>
           </a:p>
@@ -3211,7 +3211,7 @@
           <a:p>
             <a:fld id="{D5231884-8841-474E-B980-3663B77BB24B}" type="datetime1">
               <a:rPr lang="en-GB" smtClean="0"/>
-              <a:t>30/09/2025</a:t>
+              <a:t>04/10/2025</a:t>
             </a:fld>
             <a:endParaRPr lang="en-GB"/>
           </a:p>
@@ -3309,7 +3309,7 @@
           <a:p>
             <a:fld id="{981E740A-6F50-4770-9109-746EC93EBE8F}" type="datetime1">
               <a:rPr lang="en-GB" smtClean="0"/>
-              <a:t>30/09/2025</a:t>
+              <a:t>04/10/2025</a:t>
             </a:fld>
             <a:endParaRPr lang="en-GB"/>
           </a:p>
@@ -3589,7 +3589,7 @@
           <a:p>
             <a:fld id="{8C933542-D7FF-4C5D-BCD1-FC068661ADB1}" type="datetime1">
               <a:rPr lang="en-GB" smtClean="0"/>
-              <a:t>30/09/2025</a:t>
+              <a:t>04/10/2025</a:t>
             </a:fld>
             <a:endParaRPr lang="en-GB"/>
           </a:p>
@@ -3849,7 +3849,7 @@
           <a:p>
             <a:fld id="{F4A70A37-54E1-46AB-854A-7F4CAEAC5932}" type="datetime1">
               <a:rPr lang="en-GB" smtClean="0"/>
-              <a:t>30/09/2025</a:t>
+              <a:t>04/10/2025</a:t>
             </a:fld>
             <a:endParaRPr lang="en-GB"/>
           </a:p>
@@ -4073,7 +4073,7 @@
             <a:fld id="{4C18046E-BA9B-4548-A8AC-F9F2F702B23B}" type="datetime1">
               <a:rPr lang="en-GB" smtClean="0"/>
               <a:pPr/>
-              <a:t>30/09/2025</a:t>
+              <a:t>04/10/2025</a:t>
             </a:fld>
             <a:endParaRPr lang="en-GB"/>
           </a:p>
@@ -5167,7 +5167,7 @@
           <a:p>
             <a:fld id="{F4A70A37-54E1-46AB-854A-7F4CAEAC5932}" type="datetime1">
               <a:rPr lang="en-GB" smtClean="0"/>
-              <a:t>30/09/2025</a:t>
+              <a:t>04/10/2025</a:t>
             </a:fld>
             <a:endParaRPr lang="en-GB" dirty="0"/>
           </a:p>
@@ -5418,7 +5418,7 @@
           <a:p>
             <a:fld id="{F4A70A37-54E1-46AB-854A-7F4CAEAC5932}" type="datetime1">
               <a:rPr lang="en-GB" smtClean="0"/>
-              <a:t>30/09/2025</a:t>
+              <a:t>04/10/2025</a:t>
             </a:fld>
             <a:endParaRPr lang="en-GB" dirty="0"/>
           </a:p>
@@ -5631,7 +5631,7 @@
           <a:p>
             <a:fld id="{F4A70A37-54E1-46AB-854A-7F4CAEAC5932}" type="datetime1">
               <a:rPr lang="en-GB" smtClean="0"/>
-              <a:t>30/09/2025</a:t>
+              <a:t>04/10/2025</a:t>
             </a:fld>
             <a:endParaRPr lang="en-GB" dirty="0"/>
           </a:p>
@@ -5849,7 +5849,7 @@
           <a:p>
             <a:fld id="{F4A70A37-54E1-46AB-854A-7F4CAEAC5932}" type="datetime1">
               <a:rPr lang="en-GB" smtClean="0"/>
-              <a:t>30/09/2025</a:t>
+              <a:t>04/10/2025</a:t>
             </a:fld>
             <a:endParaRPr lang="en-GB" dirty="0"/>
           </a:p>
@@ -6108,7 +6108,7 @@
           <a:p>
             <a:fld id="{F4A70A37-54E1-46AB-854A-7F4CAEAC5932}" type="datetime1">
               <a:rPr lang="en-GB" smtClean="0"/>
-              <a:t>30/09/2025</a:t>
+              <a:t>04/10/2025</a:t>
             </a:fld>
             <a:endParaRPr lang="en-GB" dirty="0"/>
           </a:p>
@@ -6564,7 +6564,7 @@
           <a:p>
             <a:fld id="{F4A70A37-54E1-46AB-854A-7F4CAEAC5932}" type="datetime1">
               <a:rPr lang="en-GB" smtClean="0"/>
-              <a:t>30/09/2025</a:t>
+              <a:t>04/10/2025</a:t>
             </a:fld>
             <a:endParaRPr lang="en-GB"/>
           </a:p>
@@ -6786,7 +6786,7 @@
           <a:p>
             <a:fld id="{F4A70A37-54E1-46AB-854A-7F4CAEAC5932}" type="datetime1">
               <a:rPr lang="en-GB" smtClean="0"/>
-              <a:t>30/09/2025</a:t>
+              <a:t>04/10/2025</a:t>
             </a:fld>
             <a:endParaRPr lang="en-GB"/>
           </a:p>
@@ -7149,7 +7149,7 @@
           <a:p>
             <a:fld id="{F4A70A37-54E1-46AB-854A-7F4CAEAC5932}" type="datetime1">
               <a:rPr lang="en-GB" smtClean="0"/>
-              <a:t>30/09/2025</a:t>
+              <a:t>04/10/2025</a:t>
             </a:fld>
             <a:endParaRPr lang="en-GB"/>
           </a:p>
@@ -7586,7 +7586,7 @@
           <a:p>
             <a:fld id="{F4A70A37-54E1-46AB-854A-7F4CAEAC5932}" type="datetime1">
               <a:rPr lang="en-GB" smtClean="0"/>
-              <a:t>30/09/2025</a:t>
+              <a:t>04/10/2025</a:t>
             </a:fld>
             <a:endParaRPr lang="en-GB"/>
           </a:p>
@@ -7774,7 +7774,7 @@
           <a:p>
             <a:fld id="{F4A70A37-54E1-46AB-854A-7F4CAEAC5932}" type="datetime1">
               <a:rPr lang="en-GB" smtClean="0"/>
-              <a:t>30/09/2025</a:t>
+              <a:t>04/10/2025</a:t>
             </a:fld>
             <a:endParaRPr lang="en-GB"/>
           </a:p>
@@ -8307,7 +8307,7 @@
             <a:fld id="{19E0BBC2-331D-455A-8F34-6CACAAA7B272}" type="datetime1">
               <a:rPr lang="en-GB" smtClean="0"/>
               <a:pPr/>
-              <a:t>30/09/2025</a:t>
+              <a:t>04/10/2025</a:t>
             </a:fld>
             <a:endParaRPr lang="en-GB"/>
           </a:p>
@@ -8697,7 +8697,7 @@
           <a:p>
             <a:fld id="{F4A70A37-54E1-46AB-854A-7F4CAEAC5932}" type="datetime1">
               <a:rPr lang="en-GB" smtClean="0"/>
-              <a:t>30/09/2025</a:t>
+              <a:t>04/10/2025</a:t>
             </a:fld>
             <a:endParaRPr lang="en-GB"/>
           </a:p>
@@ -9080,7 +9080,7 @@
           <a:p>
             <a:fld id="{F4A70A37-54E1-46AB-854A-7F4CAEAC5932}" type="datetime1">
               <a:rPr lang="en-GB" smtClean="0"/>
-              <a:t>30/09/2025</a:t>
+              <a:t>04/10/2025</a:t>
             </a:fld>
             <a:endParaRPr lang="en-GB"/>
           </a:p>
@@ -9605,7 +9605,7 @@
           <a:p>
             <a:fld id="{F4A70A37-54E1-46AB-854A-7F4CAEAC5932}" type="datetime1">
               <a:rPr lang="en-GB" smtClean="0"/>
-              <a:t>30/09/2025</a:t>
+              <a:t>04/10/2025</a:t>
             </a:fld>
             <a:endParaRPr lang="en-GB"/>
           </a:p>
@@ -9965,7 +9965,7 @@
           <a:p>
             <a:fld id="{F4A70A37-54E1-46AB-854A-7F4CAEAC5932}" type="datetime1">
               <a:rPr lang="en-GB" smtClean="0"/>
-              <a:t>30/09/2025</a:t>
+              <a:t>04/10/2025</a:t>
             </a:fld>
             <a:endParaRPr lang="en-GB"/>
           </a:p>
@@ -10416,7 +10416,7 @@
             <a:fld id="{19E0BBC2-331D-455A-8F34-6CACAAA7B272}" type="datetime1">
               <a:rPr lang="en-GB" smtClean="0"/>
               <a:pPr/>
-              <a:t>30/09/2025</a:t>
+              <a:t>04/10/2025</a:t>
             </a:fld>
             <a:endParaRPr lang="en-GB"/>
           </a:p>
@@ -11118,7 +11118,7 @@
             <a:fld id="{19E0BBC2-331D-455A-8F34-6CACAAA7B272}" type="datetime1">
               <a:rPr lang="en-GB" smtClean="0"/>
               <a:pPr/>
-              <a:t>30/09/2025</a:t>
+              <a:t>04/10/2025</a:t>
             </a:fld>
             <a:endParaRPr lang="en-GB"/>
           </a:p>
@@ -11276,7 +11276,7 @@
             <a:fld id="{19E0BBC2-331D-455A-8F34-6CACAAA7B272}" type="datetime1">
               <a:rPr lang="en-GB" smtClean="0"/>
               <a:pPr/>
-              <a:t>30/09/2025</a:t>
+              <a:t>04/10/2025</a:t>
             </a:fld>
             <a:endParaRPr lang="en-GB"/>
           </a:p>
@@ -12052,7 +12052,7 @@
           <a:p>
             <a:fld id="{F4A70A37-54E1-46AB-854A-7F4CAEAC5932}" type="datetime1">
               <a:rPr lang="en-GB" smtClean="0"/>
-              <a:t>30/09/2025</a:t>
+              <a:t>04/10/2025</a:t>
             </a:fld>
             <a:endParaRPr lang="en-GB" dirty="0"/>
           </a:p>
@@ -13016,7 +13016,7 @@
           <a:p>
             <a:fld id="{F4A70A37-54E1-46AB-854A-7F4CAEAC5932}" type="datetime1">
               <a:rPr lang="en-GB" smtClean="0"/>
-              <a:t>30/09/2025</a:t>
+              <a:t>04/10/2025</a:t>
             </a:fld>
             <a:endParaRPr lang="en-GB"/>
           </a:p>
@@ -13898,7 +13898,7 @@
           <a:p>
             <a:fld id="{F4A70A37-54E1-46AB-854A-7F4CAEAC5932}" type="datetime1">
               <a:rPr lang="en-GB" smtClean="0"/>
-              <a:t>30/09/2025</a:t>
+              <a:t>04/10/2025</a:t>
             </a:fld>
             <a:endParaRPr lang="en-GB"/>
           </a:p>
@@ -14593,7 +14593,7 @@
             <a:fld id="{19E0BBC2-331D-455A-8F34-6CACAAA7B272}" type="datetime1">
               <a:rPr lang="en-GB" smtClean="0"/>
               <a:pPr/>
-              <a:t>30/09/2025</a:t>
+              <a:t>04/10/2025</a:t>
             </a:fld>
             <a:endParaRPr lang="en-GB"/>
           </a:p>
@@ -15350,7 +15350,7 @@
           <a:p>
             <a:fld id="{F4A70A37-54E1-46AB-854A-7F4CAEAC5932}" type="datetime1">
               <a:rPr lang="en-GB" smtClean="0"/>
-              <a:t>30/09/2025</a:t>
+              <a:t>04/10/2025</a:t>
             </a:fld>
             <a:endParaRPr lang="en-GB"/>
           </a:p>
@@ -16467,7 +16467,7 @@
           <a:p>
             <a:fld id="{F4A70A37-54E1-46AB-854A-7F4CAEAC5932}" type="datetime1">
               <a:rPr lang="en-GB" smtClean="0"/>
-              <a:t>30/09/2025</a:t>
+              <a:t>04/10/2025</a:t>
             </a:fld>
             <a:endParaRPr lang="en-GB"/>
           </a:p>
@@ -16620,7 +16620,7 @@
             <a:fld id="{19E0BBC2-331D-455A-8F34-6CACAAA7B272}" type="datetime1">
               <a:rPr lang="en-GB" smtClean="0"/>
               <a:pPr/>
-              <a:t>30/09/2025</a:t>
+              <a:t>04/10/2025</a:t>
             </a:fld>
             <a:endParaRPr lang="en-GB"/>
           </a:p>
@@ -16810,7 +16810,7 @@
             <a:fld id="{19E0BBC2-331D-455A-8F34-6CACAAA7B272}" type="datetime1">
               <a:rPr lang="en-GB" smtClean="0"/>
               <a:pPr/>
-              <a:t>30/09/2025</a:t>
+              <a:t>04/10/2025</a:t>
             </a:fld>
             <a:endParaRPr lang="en-GB"/>
           </a:p>
@@ -17892,7 +17892,7 @@
             <a:fld id="{19E0BBC2-331D-455A-8F34-6CACAAA7B272}" type="datetime1">
               <a:rPr lang="en-GB" smtClean="0"/>
               <a:pPr/>
-              <a:t>30/09/2025</a:t>
+              <a:t>04/10/2025</a:t>
             </a:fld>
             <a:endParaRPr lang="en-GB"/>
           </a:p>
@@ -18842,7 +18842,7 @@
             <a:fld id="{19E0BBC2-331D-455A-8F34-6CACAAA7B272}" type="datetime1">
               <a:rPr lang="en-GB" smtClean="0"/>
               <a:pPr/>
-              <a:t>30/09/2025</a:t>
+              <a:t>04/10/2025</a:t>
             </a:fld>
             <a:endParaRPr lang="en-GB"/>
           </a:p>
@@ -19150,7 +19150,7 @@
             <a:fld id="{19E0BBC2-331D-455A-8F34-6CACAAA7B272}" type="datetime1">
               <a:rPr lang="en-GB" smtClean="0"/>
               <a:pPr/>
-              <a:t>30/09/2025</a:t>
+              <a:t>04/10/2025</a:t>
             </a:fld>
             <a:endParaRPr lang="en-GB"/>
           </a:p>
@@ -19412,7 +19412,7 @@
             <a:fld id="{19E0BBC2-331D-455A-8F34-6CACAAA7B272}" type="datetime1">
               <a:rPr lang="en-GB" smtClean="0"/>
               <a:pPr/>
-              <a:t>30/09/2025</a:t>
+              <a:t>04/10/2025</a:t>
             </a:fld>
             <a:endParaRPr lang="en-GB"/>
           </a:p>
@@ -19698,7 +19698,7 @@
             <a:fld id="{19E0BBC2-331D-455A-8F34-6CACAAA7B272}" type="datetime1">
               <a:rPr lang="en-GB" smtClean="0"/>
               <a:pPr/>
-              <a:t>30/09/2025</a:t>
+              <a:t>04/10/2025</a:t>
             </a:fld>
             <a:endParaRPr lang="en-GB"/>
           </a:p>
@@ -20089,7 +20089,7 @@
             <a:fld id="{19E0BBC2-331D-455A-8F34-6CACAAA7B272}" type="datetime1">
               <a:rPr lang="en-GB" smtClean="0"/>
               <a:pPr/>
-              <a:t>30/09/2025</a:t>
+              <a:t>04/10/2025</a:t>
             </a:fld>
             <a:endParaRPr lang="en-GB"/>
           </a:p>
@@ -20421,7 +20421,7 @@
             <a:fld id="{19E0BBC2-331D-455A-8F34-6CACAAA7B272}" type="datetime1">
               <a:rPr lang="en-GB" smtClean="0"/>
               <a:pPr/>
-              <a:t>30/09/2025</a:t>
+              <a:t>04/10/2025</a:t>
             </a:fld>
             <a:endParaRPr lang="en-GB"/>
           </a:p>
@@ -20901,7 +20901,7 @@
           <a:p>
             <a:fld id="{F4A70A37-54E1-46AB-854A-7F4CAEAC5932}" type="datetime1">
               <a:rPr lang="en-GB" smtClean="0"/>
-              <a:t>30/09/2025</a:t>
+              <a:t>04/10/2025</a:t>
             </a:fld>
             <a:endParaRPr lang="en-GB" dirty="0"/>
           </a:p>

</xml_diff>